<commit_message>
10.4 proton analysis update
</commit_message>
<xml_diff>
--- a/results/rgf_analysis_11658.pptx
+++ b/results/rgf_analysis_11658.pptx
@@ -7,8 +7,9 @@
   <p:sldIdLst>
     <p:sldId id="256" r:id="rId2"/>
     <p:sldId id="259" r:id="rId3"/>
-    <p:sldId id="260" r:id="rId4"/>
-    <p:sldId id="261" r:id="rId5"/>
+    <p:sldId id="262" r:id="rId4"/>
+    <p:sldId id="260" r:id="rId5"/>
+    <p:sldId id="261" r:id="rId6"/>
   </p:sldIdLst>
   <p:sldSz cx="9144000" cy="6858000" type="screen4x3"/>
   <p:notesSz cx="6858000" cy="9144000"/>
@@ -257,7 +258,7 @@
           <a:p>
             <a:fld id="{E7325198-8183-7044-97E9-AB7594C16801}" type="datetimeFigureOut">
               <a:rPr lang="en-US" smtClean="0"/>
-              <a:t>2/20/20</a:t>
+              <a:t>2/21/20</a:t>
             </a:fld>
             <a:endParaRPr lang="en-US"/>
           </a:p>
@@ -427,7 +428,7 @@
           <a:p>
             <a:fld id="{E7325198-8183-7044-97E9-AB7594C16801}" type="datetimeFigureOut">
               <a:rPr lang="en-US" smtClean="0"/>
-              <a:t>2/20/20</a:t>
+              <a:t>2/21/20</a:t>
             </a:fld>
             <a:endParaRPr lang="en-US"/>
           </a:p>
@@ -607,7 +608,7 @@
           <a:p>
             <a:fld id="{E7325198-8183-7044-97E9-AB7594C16801}" type="datetimeFigureOut">
               <a:rPr lang="en-US" smtClean="0"/>
-              <a:t>2/20/20</a:t>
+              <a:t>2/21/20</a:t>
             </a:fld>
             <a:endParaRPr lang="en-US"/>
           </a:p>
@@ -777,7 +778,7 @@
           <a:p>
             <a:fld id="{E7325198-8183-7044-97E9-AB7594C16801}" type="datetimeFigureOut">
               <a:rPr lang="en-US" smtClean="0"/>
-              <a:t>2/20/20</a:t>
+              <a:t>2/21/20</a:t>
             </a:fld>
             <a:endParaRPr lang="en-US"/>
           </a:p>
@@ -1021,7 +1022,7 @@
           <a:p>
             <a:fld id="{E7325198-8183-7044-97E9-AB7594C16801}" type="datetimeFigureOut">
               <a:rPr lang="en-US" smtClean="0"/>
-              <a:t>2/20/20</a:t>
+              <a:t>2/21/20</a:t>
             </a:fld>
             <a:endParaRPr lang="en-US"/>
           </a:p>
@@ -1253,7 +1254,7 @@
           <a:p>
             <a:fld id="{E7325198-8183-7044-97E9-AB7594C16801}" type="datetimeFigureOut">
               <a:rPr lang="en-US" smtClean="0"/>
-              <a:t>2/20/20</a:t>
+              <a:t>2/21/20</a:t>
             </a:fld>
             <a:endParaRPr lang="en-US"/>
           </a:p>
@@ -1620,7 +1621,7 @@
           <a:p>
             <a:fld id="{E7325198-8183-7044-97E9-AB7594C16801}" type="datetimeFigureOut">
               <a:rPr lang="en-US" smtClean="0"/>
-              <a:t>2/20/20</a:t>
+              <a:t>2/21/20</a:t>
             </a:fld>
             <a:endParaRPr lang="en-US"/>
           </a:p>
@@ -1738,7 +1739,7 @@
           <a:p>
             <a:fld id="{E7325198-8183-7044-97E9-AB7594C16801}" type="datetimeFigureOut">
               <a:rPr lang="en-US" smtClean="0"/>
-              <a:t>2/20/20</a:t>
+              <a:t>2/21/20</a:t>
             </a:fld>
             <a:endParaRPr lang="en-US"/>
           </a:p>
@@ -1833,7 +1834,7 @@
           <a:p>
             <a:fld id="{E7325198-8183-7044-97E9-AB7594C16801}" type="datetimeFigureOut">
               <a:rPr lang="en-US" smtClean="0"/>
-              <a:t>2/20/20</a:t>
+              <a:t>2/21/20</a:t>
             </a:fld>
             <a:endParaRPr lang="en-US"/>
           </a:p>
@@ -2110,7 +2111,7 @@
           <a:p>
             <a:fld id="{E7325198-8183-7044-97E9-AB7594C16801}" type="datetimeFigureOut">
               <a:rPr lang="en-US" smtClean="0"/>
-              <a:t>2/20/20</a:t>
+              <a:t>2/21/20</a:t>
             </a:fld>
             <a:endParaRPr lang="en-US"/>
           </a:p>
@@ -2367,7 +2368,7 @@
           <a:p>
             <a:fld id="{E7325198-8183-7044-97E9-AB7594C16801}" type="datetimeFigureOut">
               <a:rPr lang="en-US" smtClean="0"/>
-              <a:t>2/20/20</a:t>
+              <a:t>2/21/20</a:t>
             </a:fld>
             <a:endParaRPr lang="en-US"/>
           </a:p>
@@ -2580,7 +2581,7 @@
           <a:p>
             <a:fld id="{E7325198-8183-7044-97E9-AB7594C16801}" type="datetimeFigureOut">
               <a:rPr lang="en-US" smtClean="0"/>
-              <a:t>2/20/20</a:t>
+              <a:t>2/21/20</a:t>
             </a:fld>
             <a:endParaRPr lang="en-US"/>
           </a:p>
@@ -3029,15 +3030,7 @@
                 <a:ea typeface="Abadi MT Condensed Light" charset="0"/>
                 <a:cs typeface="Abadi MT Condensed Light" charset="0"/>
               </a:rPr>
-              <a:t> Run </a:t>
-            </a:r>
-            <a:r>
-              <a:rPr lang="en-US" sz="4000" b="1" dirty="0" smtClean="0">
-                <a:latin typeface="Abadi MT Condensed Light" charset="0"/>
-                <a:ea typeface="Abadi MT Condensed Light" charset="0"/>
-                <a:cs typeface="Abadi MT Condensed Light" charset="0"/>
-              </a:rPr>
-              <a:t>11658</a:t>
+              <a:t> Run 11658</a:t>
             </a:r>
             <a:endParaRPr lang="en-US" sz="4000" b="1" dirty="0">
               <a:latin typeface="Abadi MT Condensed Light" charset="0"/>
@@ -3070,7 +3063,7 @@
         <p:spPr>
           <a:xfrm>
             <a:off x="0" y="1274477"/>
-            <a:ext cx="9144000" cy="4309046"/>
+            <a:ext cx="9143999" cy="4309046"/>
           </a:xfrm>
           <a:prstGeom prst="rect">
             <a:avLst/>
@@ -3174,8 +3167,8 @@
         </p:blipFill>
         <p:spPr>
           <a:xfrm>
-            <a:off x="0" y="1260662"/>
-            <a:ext cx="9144000" cy="4336676"/>
+            <a:off x="0" y="1443182"/>
+            <a:ext cx="9144000" cy="3971636"/>
           </a:xfrm>
           <a:prstGeom prst="rect">
             <a:avLst/>
@@ -3226,15 +3219,7 @@
                 <a:ea typeface="Abadi MT Condensed Light" charset="0"/>
                 <a:cs typeface="Abadi MT Condensed Light" charset="0"/>
               </a:rPr>
-              <a:t> Run </a:t>
-            </a:r>
-            <a:r>
-              <a:rPr lang="en-US" sz="4000" b="1" dirty="0" smtClean="0">
-                <a:latin typeface="Abadi MT Condensed Light" charset="0"/>
-                <a:ea typeface="Abadi MT Condensed Light" charset="0"/>
-                <a:cs typeface="Abadi MT Condensed Light" charset="0"/>
-              </a:rPr>
-              <a:t>11658</a:t>
+              <a:t> Run 11658</a:t>
             </a:r>
             <a:endParaRPr lang="en-US" sz="4000" b="1" dirty="0">
               <a:latin typeface="Abadi MT Condensed Light" charset="0"/>
@@ -3355,15 +3340,7 @@
                 <a:ea typeface="Abadi MT Condensed Light" charset="0"/>
                 <a:cs typeface="Abadi MT Condensed Light" charset="0"/>
               </a:rPr>
-              <a:t> Run </a:t>
-            </a:r>
-            <a:r>
-              <a:rPr lang="en-US" sz="4000" b="1" dirty="0" smtClean="0">
-                <a:latin typeface="Abadi MT Condensed Light" charset="0"/>
-                <a:ea typeface="Abadi MT Condensed Light" charset="0"/>
-                <a:cs typeface="Abadi MT Condensed Light" charset="0"/>
-              </a:rPr>
-              <a:t>11658</a:t>
+              <a:t> Run 11658</a:t>
             </a:r>
             <a:endParaRPr lang="en-US" sz="4000" b="1" dirty="0">
               <a:latin typeface="Abadi MT Condensed Light" charset="0"/>
@@ -3376,7 +3353,7 @@
     </p:spTree>
     <p:extLst>
       <p:ext uri="{BB962C8B-B14F-4D97-AF65-F5344CB8AC3E}">
-        <p14:creationId xmlns:p14="http://schemas.microsoft.com/office/powerpoint/2010/main" val="1497586177"/>
+        <p14:creationId xmlns:p14="http://schemas.microsoft.com/office/powerpoint/2010/main" val="1907290946"/>
       </p:ext>
     </p:extLst>
   </p:cSld>
@@ -3484,15 +3461,128 @@
                 <a:ea typeface="Abadi MT Condensed Light" charset="0"/>
                 <a:cs typeface="Abadi MT Condensed Light" charset="0"/>
               </a:rPr>
-              <a:t> Run </a:t>
-            </a:r>
+              <a:t> Run 11658</a:t>
+            </a:r>
+            <a:endParaRPr lang="en-US" sz="4000" b="1" dirty="0">
+              <a:latin typeface="Abadi MT Condensed Light" charset="0"/>
+              <a:ea typeface="Abadi MT Condensed Light" charset="0"/>
+              <a:cs typeface="Abadi MT Condensed Light" charset="0"/>
+            </a:endParaRPr>
+          </a:p>
+        </p:txBody>
+      </p:sp>
+    </p:spTree>
+    <p:extLst>
+      <p:ext uri="{BB962C8B-B14F-4D97-AF65-F5344CB8AC3E}">
+        <p14:creationId xmlns:p14="http://schemas.microsoft.com/office/powerpoint/2010/main" val="1497586177"/>
+      </p:ext>
+    </p:extLst>
+  </p:cSld>
+  <p:clrMapOvr>
+    <a:masterClrMapping/>
+  </p:clrMapOvr>
+  <p:timing>
+    <p:tnLst>
+      <p:par>
+        <p:cTn id="1" dur="indefinite" restart="never" nodeType="tmRoot"/>
+      </p:par>
+    </p:tnLst>
+  </p:timing>
+</p:sld>
+</file>
+
+<file path=ppt/slides/slide5.xml><?xml version="1.0" encoding="utf-8"?>
+<p:sld xmlns:a="http://schemas.openxmlformats.org/drawingml/2006/main" xmlns:r="http://schemas.openxmlformats.org/officeDocument/2006/relationships" xmlns:p="http://schemas.openxmlformats.org/presentationml/2006/main">
+  <p:cSld>
+    <p:spTree>
+      <p:nvGrpSpPr>
+        <p:cNvPr id="1" name=""/>
+        <p:cNvGrpSpPr/>
+        <p:nvPr/>
+      </p:nvGrpSpPr>
+      <p:grpSpPr>
+        <a:xfrm>
+          <a:off x="0" y="0"/>
+          <a:ext cx="0" cy="0"/>
+          <a:chOff x="0" y="0"/>
+          <a:chExt cx="0" cy="0"/>
+        </a:xfrm>
+      </p:grpSpPr>
+      <p:pic>
+        <p:nvPicPr>
+          <p:cNvPr id="2" name="Picture 1"/>
+          <p:cNvPicPr>
+            <a:picLocks noChangeAspect="1"/>
+          </p:cNvPicPr>
+          <p:nvPr/>
+        </p:nvPicPr>
+        <p:blipFill>
+          <a:blip r:embed="rId2">
+            <a:extLst>
+              <a:ext uri="{28A0092B-C50C-407E-A947-70E740481C1C}">
+                <a14:useLocalDpi xmlns:a14="http://schemas.microsoft.com/office/drawing/2010/main" val="0"/>
+              </a:ext>
+            </a:extLst>
+          </a:blip>
+          <a:stretch>
+            <a:fillRect/>
+          </a:stretch>
+        </p:blipFill>
+        <p:spPr>
+          <a:xfrm>
+            <a:off x="1" y="1260662"/>
+            <a:ext cx="9143996" cy="4336675"/>
+          </a:xfrm>
+          <a:prstGeom prst="rect">
+            <a:avLst/>
+          </a:prstGeom>
+        </p:spPr>
+      </p:pic>
+      <p:sp>
+        <p:nvSpPr>
+          <p:cNvPr id="5" name="TextBox 4"/>
+          <p:cNvSpPr txBox="1"/>
+          <p:nvPr/>
+        </p:nvSpPr>
+        <p:spPr>
+          <a:xfrm>
+            <a:off x="1929932" y="0"/>
+            <a:ext cx="4938147" cy="707886"/>
+          </a:xfrm>
+          <a:prstGeom prst="rect">
+            <a:avLst/>
+          </a:prstGeom>
+          <a:noFill/>
+        </p:spPr>
+        <p:txBody>
+          <a:bodyPr wrap="none" rtlCol="0">
+            <a:spAutoFit/>
+          </a:bodyPr>
+          <a:lstStyle/>
+          <a:p>
             <a:r>
               <a:rPr lang="en-US" sz="4000" b="1" dirty="0" smtClean="0">
                 <a:latin typeface="Abadi MT Condensed Light" charset="0"/>
                 <a:ea typeface="Abadi MT Condensed Light" charset="0"/>
                 <a:cs typeface="Abadi MT Condensed Light" charset="0"/>
               </a:rPr>
-              <a:t>11658</a:t>
+              <a:t>RG-F Analysis </a:t>
+            </a:r>
+            <a:r>
+              <a:rPr lang="mr-IN" sz="4000" b="1" dirty="0" smtClean="0">
+                <a:latin typeface="Abadi MT Condensed Light" charset="0"/>
+                <a:ea typeface="Abadi MT Condensed Light" charset="0"/>
+                <a:cs typeface="Abadi MT Condensed Light" charset="0"/>
+              </a:rPr>
+              <a:t>–</a:t>
+            </a:r>
+            <a:r>
+              <a:rPr lang="en-US" sz="4000" b="1" dirty="0" smtClean="0">
+                <a:latin typeface="Abadi MT Condensed Light" charset="0"/>
+                <a:ea typeface="Abadi MT Condensed Light" charset="0"/>
+                <a:cs typeface="Abadi MT Condensed Light" charset="0"/>
+              </a:rPr>
+              <a:t> Run 11658</a:t>
             </a:r>
             <a:endParaRPr lang="en-US" sz="4000" b="1" dirty="0">
               <a:latin typeface="Abadi MT Condensed Light" charset="0"/>

</xml_diff>